<commit_message>
with css adaptative to tablet width 768px
</commit_message>
<xml_diff>
--- a/maquettes.pptx
+++ b/maquettes.pptx
@@ -200,7 +200,7 @@
           <a:p>
             <a:fld id="{E6CC18D8-2793-BA48-9CD5-DB080EE738BD}" type="datetimeFigureOut">
               <a:rPr lang="fr-FR" smtClean="0"/>
-              <a:t>22/09/2020</a:t>
+              <a:t>21/10/2020</a:t>
             </a:fld>
             <a:endParaRPr lang="fr-FR"/>
           </a:p>
@@ -599,7 +599,7 @@
           <a:p>
             <a:fld id="{E879B6DE-632D-F54A-81D8-38C41549D126}" type="datetimeFigureOut">
               <a:rPr lang="fr-FR" smtClean="0"/>
-              <a:t>22/09/2020</a:t>
+              <a:t>21/10/2020</a:t>
             </a:fld>
             <a:endParaRPr lang="fr-FR"/>
           </a:p>
@@ -764,7 +764,7 @@
           <a:p>
             <a:fld id="{E879B6DE-632D-F54A-81D8-38C41549D126}" type="datetimeFigureOut">
               <a:rPr lang="fr-FR" smtClean="0"/>
-              <a:t>22/09/2020</a:t>
+              <a:t>21/10/2020</a:t>
             </a:fld>
             <a:endParaRPr lang="fr-FR"/>
           </a:p>
@@ -939,7 +939,7 @@
           <a:p>
             <a:fld id="{E879B6DE-632D-F54A-81D8-38C41549D126}" type="datetimeFigureOut">
               <a:rPr lang="fr-FR" smtClean="0"/>
-              <a:t>22/09/2020</a:t>
+              <a:t>21/10/2020</a:t>
             </a:fld>
             <a:endParaRPr lang="fr-FR"/>
           </a:p>
@@ -1104,7 +1104,7 @@
           <a:p>
             <a:fld id="{E879B6DE-632D-F54A-81D8-38C41549D126}" type="datetimeFigureOut">
               <a:rPr lang="fr-FR" smtClean="0"/>
-              <a:t>22/09/2020</a:t>
+              <a:t>21/10/2020</a:t>
             </a:fld>
             <a:endParaRPr lang="fr-FR"/>
           </a:p>
@@ -1343,7 +1343,7 @@
           <a:p>
             <a:fld id="{E879B6DE-632D-F54A-81D8-38C41549D126}" type="datetimeFigureOut">
               <a:rPr lang="fr-FR" smtClean="0"/>
-              <a:t>22/09/2020</a:t>
+              <a:t>21/10/2020</a:t>
             </a:fld>
             <a:endParaRPr lang="fr-FR"/>
           </a:p>
@@ -1570,7 +1570,7 @@
           <a:p>
             <a:fld id="{E879B6DE-632D-F54A-81D8-38C41549D126}" type="datetimeFigureOut">
               <a:rPr lang="fr-FR" smtClean="0"/>
-              <a:t>22/09/2020</a:t>
+              <a:t>21/10/2020</a:t>
             </a:fld>
             <a:endParaRPr lang="fr-FR"/>
           </a:p>
@@ -1932,7 +1932,7 @@
           <a:p>
             <a:fld id="{E879B6DE-632D-F54A-81D8-38C41549D126}" type="datetimeFigureOut">
               <a:rPr lang="fr-FR" smtClean="0"/>
-              <a:t>22/09/2020</a:t>
+              <a:t>21/10/2020</a:t>
             </a:fld>
             <a:endParaRPr lang="fr-FR"/>
           </a:p>
@@ -2045,7 +2045,7 @@
           <a:p>
             <a:fld id="{E879B6DE-632D-F54A-81D8-38C41549D126}" type="datetimeFigureOut">
               <a:rPr lang="fr-FR" smtClean="0"/>
-              <a:t>22/09/2020</a:t>
+              <a:t>21/10/2020</a:t>
             </a:fld>
             <a:endParaRPr lang="fr-FR"/>
           </a:p>
@@ -2135,7 +2135,7 @@
           <a:p>
             <a:fld id="{E879B6DE-632D-F54A-81D8-38C41549D126}" type="datetimeFigureOut">
               <a:rPr lang="fr-FR" smtClean="0"/>
-              <a:t>22/09/2020</a:t>
+              <a:t>21/10/2020</a:t>
             </a:fld>
             <a:endParaRPr lang="fr-FR"/>
           </a:p>
@@ -2407,7 +2407,7 @@
           <a:p>
             <a:fld id="{E879B6DE-632D-F54A-81D8-38C41549D126}" type="datetimeFigureOut">
               <a:rPr lang="fr-FR" smtClean="0"/>
-              <a:t>22/09/2020</a:t>
+              <a:t>21/10/2020</a:t>
             </a:fld>
             <a:endParaRPr lang="fr-FR"/>
           </a:p>
@@ -2659,7 +2659,7 @@
           <a:p>
             <a:fld id="{E879B6DE-632D-F54A-81D8-38C41549D126}" type="datetimeFigureOut">
               <a:rPr lang="fr-FR" smtClean="0"/>
-              <a:t>22/09/2020</a:t>
+              <a:t>21/10/2020</a:t>
             </a:fld>
             <a:endParaRPr lang="fr-FR"/>
           </a:p>
@@ -2867,7 +2867,7 @@
           <a:p>
             <a:fld id="{E879B6DE-632D-F54A-81D8-38C41549D126}" type="datetimeFigureOut">
               <a:rPr lang="fr-FR" smtClean="0"/>
-              <a:t>22/09/2020</a:t>
+              <a:t>21/10/2020</a:t>
             </a:fld>
             <a:endParaRPr lang="fr-FR"/>
           </a:p>
@@ -4269,377 +4269,359 @@
           </p:style>
         </p:cxnSp>
       </p:grpSp>
-      <p:sp>
-        <p:nvSpPr>
-          <p:cNvPr id="17" name="ZoneTexte 16"/>
-          <p:cNvSpPr txBox="1"/>
+      <p:grpSp>
+        <p:nvGrpSpPr>
+          <p:cNvPr id="10" name="Grouper 9"/>
+          <p:cNvGrpSpPr/>
           <p:nvPr/>
-        </p:nvSpPr>
-        <p:spPr>
-          <a:xfrm rot="18937738">
-            <a:off x="-506018" y="1667354"/>
-            <a:ext cx="2880025" cy="646331"/>
-          </a:xfrm>
-          <a:prstGeom prst="rect">
-            <a:avLst/>
-          </a:prstGeom>
-          <a:noFill/>
-        </p:spPr>
-        <p:txBody>
-          <a:bodyPr wrap="square" rtlCol="0">
-            <a:spAutoFit/>
-          </a:bodyPr>
-          <a:lstStyle/>
-          <a:p>
-            <a:r>
-              <a:rPr lang="fr-FR" sz="3600" dirty="0">
-                <a:solidFill>
-                  <a:srgbClr val="5B9BD5"/>
-                </a:solidFill>
-              </a:rPr>
-              <a:t>+icones</a:t>
-            </a:r>
-          </a:p>
-        </p:txBody>
-      </p:sp>
-      <p:sp>
-        <p:nvSpPr>
-          <p:cNvPr id="18" name="Rectangle 17"/>
-          <p:cNvSpPr/>
-          <p:nvPr/>
-        </p:nvSpPr>
-        <p:spPr>
-          <a:xfrm>
-            <a:off x="5699761" y="182880"/>
-            <a:ext cx="2449286" cy="400110"/>
-          </a:xfrm>
-          <a:prstGeom prst="rect">
-            <a:avLst/>
-          </a:prstGeom>
-        </p:spPr>
-        <p:txBody>
-          <a:bodyPr wrap="square">
-            <a:spAutoFit/>
-          </a:bodyPr>
-          <a:lstStyle/>
-          <a:p>
-            <a:pPr algn="ctr"/>
-            <a:r>
-              <a:rPr lang="fr-FR" sz="2000" dirty="0" smtClean="0">
+        </p:nvGrpSpPr>
+        <p:grpSpPr>
+          <a:xfrm>
+            <a:off x="2321258" y="4615158"/>
+            <a:ext cx="2995746" cy="2459795"/>
+            <a:chOff x="5699761" y="182880"/>
+            <a:chExt cx="2995746" cy="2459795"/>
+          </a:xfrm>
+        </p:grpSpPr>
+        <p:sp>
+          <p:nvSpPr>
+            <p:cNvPr id="18" name="Rectangle 17"/>
+            <p:cNvSpPr/>
+            <p:nvPr/>
+          </p:nvSpPr>
+          <p:spPr>
+            <a:xfrm>
+              <a:off x="5699761" y="182880"/>
+              <a:ext cx="2449286" cy="400110"/>
+            </a:xfrm>
+            <a:prstGeom prst="rect">
+              <a:avLst/>
+            </a:prstGeom>
+          </p:spPr>
+          <p:txBody>
+            <a:bodyPr wrap="square">
+              <a:spAutoFit/>
+            </a:bodyPr>
+            <a:lstStyle/>
+            <a:p>
+              <a:pPr algn="ctr"/>
+              <a:r>
+                <a:rPr lang="fr-FR" sz="2000" dirty="0" smtClean="0">
+                  <a:solidFill>
+                    <a:srgbClr val="B43F94"/>
+                  </a:solidFill>
+                </a:rPr>
+                <a:t>Techniques </a:t>
+              </a:r>
+            </a:p>
+          </p:txBody>
+        </p:sp>
+        <p:sp>
+          <p:nvSpPr>
+            <p:cNvPr id="19" name="Rectangle 18"/>
+            <p:cNvSpPr/>
+            <p:nvPr/>
+          </p:nvSpPr>
+          <p:spPr>
+            <a:xfrm>
+              <a:off x="6210299" y="630168"/>
+              <a:ext cx="1033484" cy="307777"/>
+            </a:xfrm>
+            <a:prstGeom prst="rect">
+              <a:avLst/>
+            </a:prstGeom>
+          </p:spPr>
+          <p:txBody>
+            <a:bodyPr wrap="square">
+              <a:spAutoFit/>
+            </a:bodyPr>
+            <a:lstStyle/>
+            <a:p>
+              <a:pPr algn="ctr"/>
+              <a:r>
+                <a:rPr lang="fr-FR" sz="1400" dirty="0" err="1" smtClean="0">
+                  <a:solidFill>
+                    <a:srgbClr val="B43F94"/>
+                  </a:solidFill>
+                </a:rPr>
+                <a:t>Javascript</a:t>
+              </a:r>
+              <a:endParaRPr lang="fr-FR" sz="1400" dirty="0" smtClean="0">
                 <a:solidFill>
                   <a:srgbClr val="B43F94"/>
                 </a:solidFill>
-              </a:rPr>
-              <a:t>Techniques </a:t>
-            </a:r>
-          </a:p>
-        </p:txBody>
-      </p:sp>
-      <p:sp>
-        <p:nvSpPr>
-          <p:cNvPr id="19" name="Rectangle 18"/>
-          <p:cNvSpPr/>
-          <p:nvPr/>
-        </p:nvSpPr>
-        <p:spPr>
-          <a:xfrm>
-            <a:off x="6210299" y="630168"/>
-            <a:ext cx="1033484" cy="307777"/>
-          </a:xfrm>
-          <a:prstGeom prst="rect">
-            <a:avLst/>
-          </a:prstGeom>
-        </p:spPr>
-        <p:txBody>
-          <a:bodyPr wrap="square">
-            <a:spAutoFit/>
-          </a:bodyPr>
-          <a:lstStyle/>
-          <a:p>
-            <a:pPr algn="ctr"/>
-            <a:r>
-              <a:rPr lang="fr-FR" sz="1400" dirty="0" err="1" smtClean="0">
+              </a:endParaRPr>
+            </a:p>
+          </p:txBody>
+        </p:sp>
+        <p:sp>
+          <p:nvSpPr>
+            <p:cNvPr id="20" name="Rectangle 19"/>
+            <p:cNvSpPr/>
+            <p:nvPr/>
+          </p:nvSpPr>
+          <p:spPr>
+            <a:xfrm>
+              <a:off x="7461068" y="1609673"/>
+              <a:ext cx="1234439" cy="307777"/>
+            </a:xfrm>
+            <a:prstGeom prst="rect">
+              <a:avLst/>
+            </a:prstGeom>
+          </p:spPr>
+          <p:txBody>
+            <a:bodyPr wrap="square">
+              <a:spAutoFit/>
+            </a:bodyPr>
+            <a:lstStyle/>
+            <a:p>
+              <a:pPr algn="ctr"/>
+              <a:r>
+                <a:rPr lang="fr-FR" sz="1400" dirty="0" err="1" smtClean="0">
+                  <a:solidFill>
+                    <a:srgbClr val="B43F94"/>
+                  </a:solidFill>
+                </a:rPr>
+                <a:t>Node</a:t>
+              </a:r>
+              <a:endParaRPr lang="fr-FR" sz="1400" dirty="0" smtClean="0">
                 <a:solidFill>
                   <a:srgbClr val="B43F94"/>
                 </a:solidFill>
-              </a:rPr>
-              <a:t>Javascript</a:t>
-            </a:r>
-            <a:endParaRPr lang="fr-FR" sz="1400" dirty="0" smtClean="0">
-              <a:solidFill>
-                <a:srgbClr val="B43F94"/>
-              </a:solidFill>
-            </a:endParaRPr>
-          </a:p>
-        </p:txBody>
-      </p:sp>
-      <p:sp>
-        <p:nvSpPr>
-          <p:cNvPr id="20" name="Rectangle 19"/>
-          <p:cNvSpPr/>
-          <p:nvPr/>
-        </p:nvSpPr>
-        <p:spPr>
-          <a:xfrm>
-            <a:off x="7461068" y="1609673"/>
-            <a:ext cx="1234439" cy="307777"/>
-          </a:xfrm>
-          <a:prstGeom prst="rect">
-            <a:avLst/>
-          </a:prstGeom>
-        </p:spPr>
-        <p:txBody>
-          <a:bodyPr wrap="square">
-            <a:spAutoFit/>
-          </a:bodyPr>
-          <a:lstStyle/>
-          <a:p>
-            <a:pPr algn="ctr"/>
-            <a:r>
-              <a:rPr lang="fr-FR" sz="1400" dirty="0" err="1" smtClean="0">
+              </a:endParaRPr>
+            </a:p>
+          </p:txBody>
+        </p:sp>
+        <p:sp>
+          <p:nvSpPr>
+            <p:cNvPr id="21" name="Rectangle 20"/>
+            <p:cNvSpPr/>
+            <p:nvPr/>
+          </p:nvSpPr>
+          <p:spPr>
+            <a:xfrm>
+              <a:off x="6361611" y="2334898"/>
+              <a:ext cx="719546" cy="307777"/>
+            </a:xfrm>
+            <a:prstGeom prst="rect">
+              <a:avLst/>
+            </a:prstGeom>
+          </p:spPr>
+          <p:txBody>
+            <a:bodyPr wrap="square">
+              <a:spAutoFit/>
+            </a:bodyPr>
+            <a:lstStyle/>
+            <a:p>
+              <a:pPr algn="ctr"/>
+              <a:r>
+                <a:rPr lang="fr-FR" sz="1400" smtClean="0">
+                  <a:solidFill>
+                    <a:srgbClr val="B43F94"/>
+                  </a:solidFill>
+                </a:rPr>
+                <a:t>React</a:t>
+              </a:r>
+              <a:endParaRPr lang="fr-FR" sz="1400" dirty="0" smtClean="0">
                 <a:solidFill>
                   <a:srgbClr val="B43F94"/>
                 </a:solidFill>
-              </a:rPr>
-              <a:t>Node</a:t>
-            </a:r>
-            <a:endParaRPr lang="fr-FR" sz="1400" dirty="0" smtClean="0">
+              </a:endParaRPr>
+            </a:p>
+          </p:txBody>
+        </p:sp>
+        <p:sp>
+          <p:nvSpPr>
+            <p:cNvPr id="22" name="Rectangle 21"/>
+            <p:cNvSpPr/>
+            <p:nvPr/>
+          </p:nvSpPr>
+          <p:spPr>
+            <a:xfrm>
+              <a:off x="6200600" y="1293016"/>
+              <a:ext cx="1493521" cy="313697"/>
+            </a:xfrm>
+            <a:prstGeom prst="rect">
+              <a:avLst/>
+            </a:prstGeom>
+          </p:spPr>
+          <p:txBody>
+            <a:bodyPr wrap="square">
+              <a:spAutoFit/>
+            </a:bodyPr>
+            <a:lstStyle/>
+            <a:p>
+              <a:pPr algn="ctr"/>
+              <a:r>
+                <a:rPr lang="fr-FR" sz="1400" dirty="0" smtClean="0">
+                  <a:solidFill>
+                    <a:srgbClr val="B43F94"/>
+                  </a:solidFill>
+                </a:rPr>
+                <a:t>CSS/ HTML</a:t>
+              </a:r>
+            </a:p>
+          </p:txBody>
+        </p:sp>
+        <p:cxnSp>
+          <p:nvCxnSpPr>
+            <p:cNvPr id="26" name="Connecteur en arc 25"/>
+            <p:cNvCxnSpPr>
+              <a:stCxn id="19" idx="3"/>
+              <a:endCxn id="20" idx="0"/>
+            </p:cNvCxnSpPr>
+            <p:nvPr/>
+          </p:nvCxnSpPr>
+          <p:spPr>
+            <a:xfrm>
+              <a:off x="7243783" y="784057"/>
+              <a:ext cx="834505" cy="825616"/>
+            </a:xfrm>
+            <a:prstGeom prst="curvedConnector2">
+              <a:avLst/>
+            </a:prstGeom>
+            <a:ln>
               <a:solidFill>
-                <a:srgbClr val="B43F94"/>
+                <a:srgbClr val="913478"/>
               </a:solidFill>
-            </a:endParaRPr>
-          </a:p>
-        </p:txBody>
-      </p:sp>
-      <p:sp>
-        <p:nvSpPr>
-          <p:cNvPr id="21" name="Rectangle 20"/>
-          <p:cNvSpPr/>
-          <p:nvPr/>
-        </p:nvSpPr>
-        <p:spPr>
-          <a:xfrm>
-            <a:off x="6361611" y="2334898"/>
-            <a:ext cx="719546" cy="307777"/>
-          </a:xfrm>
-          <a:prstGeom prst="rect">
-            <a:avLst/>
-          </a:prstGeom>
-        </p:spPr>
-        <p:txBody>
-          <a:bodyPr wrap="square">
-            <a:spAutoFit/>
-          </a:bodyPr>
-          <a:lstStyle/>
-          <a:p>
-            <a:pPr algn="ctr"/>
-            <a:r>
-              <a:rPr lang="fr-FR" sz="1400" smtClean="0">
-                <a:solidFill>
-                  <a:srgbClr val="B43F94"/>
-                </a:solidFill>
-              </a:rPr>
-              <a:t>React</a:t>
-            </a:r>
-            <a:endParaRPr lang="fr-FR" sz="1400" dirty="0" smtClean="0">
+            </a:ln>
+          </p:spPr>
+          <p:style>
+            <a:lnRef idx="1">
+              <a:schemeClr val="accent1"/>
+            </a:lnRef>
+            <a:fillRef idx="0">
+              <a:schemeClr val="accent1"/>
+            </a:fillRef>
+            <a:effectRef idx="0">
+              <a:schemeClr val="accent1"/>
+            </a:effectRef>
+            <a:fontRef idx="minor">
+              <a:schemeClr val="tx1"/>
+            </a:fontRef>
+          </p:style>
+        </p:cxnSp>
+        <p:cxnSp>
+          <p:nvCxnSpPr>
+            <p:cNvPr id="30" name="Connecteur en arc 29"/>
+            <p:cNvCxnSpPr>
+              <a:stCxn id="19" idx="1"/>
+              <a:endCxn id="22" idx="0"/>
+            </p:cNvCxnSpPr>
+            <p:nvPr/>
+          </p:nvCxnSpPr>
+          <p:spPr>
+            <a:xfrm rot="10800000" flipH="1" flipV="1">
+              <a:off x="6210299" y="784056"/>
+              <a:ext cx="737062" cy="508959"/>
+            </a:xfrm>
+            <a:prstGeom prst="curvedConnector4">
+              <a:avLst>
+                <a:gd name="adj1" fmla="val -31015"/>
+                <a:gd name="adj2" fmla="val 65118"/>
+              </a:avLst>
+            </a:prstGeom>
+            <a:ln>
               <a:solidFill>
-                <a:srgbClr val="B43F94"/>
+                <a:srgbClr val="913478"/>
               </a:solidFill>
-            </a:endParaRPr>
-          </a:p>
-        </p:txBody>
-      </p:sp>
-      <p:sp>
-        <p:nvSpPr>
-          <p:cNvPr id="22" name="Rectangle 21"/>
-          <p:cNvSpPr/>
-          <p:nvPr/>
-        </p:nvSpPr>
-        <p:spPr>
-          <a:xfrm>
-            <a:off x="6200600" y="1293016"/>
-            <a:ext cx="1493521" cy="313697"/>
-          </a:xfrm>
-          <a:prstGeom prst="rect">
-            <a:avLst/>
-          </a:prstGeom>
-        </p:spPr>
-        <p:txBody>
-          <a:bodyPr wrap="square">
-            <a:spAutoFit/>
-          </a:bodyPr>
-          <a:lstStyle/>
-          <a:p>
-            <a:pPr algn="ctr"/>
-            <a:r>
-              <a:rPr lang="fr-FR" sz="1400" dirty="0" smtClean="0">
-                <a:solidFill>
-                  <a:srgbClr val="B43F94"/>
-                </a:solidFill>
-              </a:rPr>
-              <a:t>CSS/ HTML</a:t>
-            </a:r>
-          </a:p>
-        </p:txBody>
-      </p:sp>
-      <p:cxnSp>
-        <p:nvCxnSpPr>
-          <p:cNvPr id="26" name="Connecteur en arc 25"/>
-          <p:cNvCxnSpPr>
-            <a:stCxn id="19" idx="3"/>
-            <a:endCxn id="20" idx="0"/>
-          </p:cNvCxnSpPr>
-          <p:nvPr/>
-        </p:nvCxnSpPr>
-        <p:spPr>
-          <a:xfrm>
-            <a:off x="7243783" y="784057"/>
-            <a:ext cx="834505" cy="825616"/>
-          </a:xfrm>
-          <a:prstGeom prst="curvedConnector2">
-            <a:avLst/>
-          </a:prstGeom>
-          <a:ln>
-            <a:solidFill>
-              <a:srgbClr val="913478"/>
-            </a:solidFill>
-          </a:ln>
-        </p:spPr>
-        <p:style>
-          <a:lnRef idx="1">
-            <a:schemeClr val="accent1"/>
-          </a:lnRef>
-          <a:fillRef idx="0">
-            <a:schemeClr val="accent1"/>
-          </a:fillRef>
-          <a:effectRef idx="0">
-            <a:schemeClr val="accent1"/>
-          </a:effectRef>
-          <a:fontRef idx="minor">
-            <a:schemeClr val="tx1"/>
-          </a:fontRef>
-        </p:style>
-      </p:cxnSp>
-      <p:cxnSp>
-        <p:nvCxnSpPr>
-          <p:cNvPr id="30" name="Connecteur en arc 29"/>
-          <p:cNvCxnSpPr>
-            <a:stCxn id="19" idx="1"/>
-            <a:endCxn id="22" idx="0"/>
-          </p:cNvCxnSpPr>
-          <p:nvPr/>
-        </p:nvCxnSpPr>
-        <p:spPr>
-          <a:xfrm rot="10800000" flipH="1" flipV="1">
-            <a:off x="6210299" y="784056"/>
-            <a:ext cx="737062" cy="508959"/>
-          </a:xfrm>
-          <a:prstGeom prst="curvedConnector4">
-            <a:avLst>
-              <a:gd name="adj1" fmla="val -31015"/>
-              <a:gd name="adj2" fmla="val 65118"/>
-            </a:avLst>
-          </a:prstGeom>
-          <a:ln>
-            <a:solidFill>
-              <a:srgbClr val="913478"/>
-            </a:solidFill>
-          </a:ln>
-        </p:spPr>
-        <p:style>
-          <a:lnRef idx="1">
-            <a:schemeClr val="accent1"/>
-          </a:lnRef>
-          <a:fillRef idx="0">
-            <a:schemeClr val="accent1"/>
-          </a:fillRef>
-          <a:effectRef idx="0">
-            <a:schemeClr val="accent1"/>
-          </a:effectRef>
-          <a:fontRef idx="minor">
-            <a:schemeClr val="tx1"/>
-          </a:fontRef>
-        </p:style>
-      </p:cxnSp>
-      <p:cxnSp>
-        <p:nvCxnSpPr>
-          <p:cNvPr id="34" name="Connecteur en arc 33"/>
-          <p:cNvCxnSpPr>
-            <a:stCxn id="22" idx="2"/>
-            <a:endCxn id="21" idx="1"/>
-          </p:cNvCxnSpPr>
-          <p:nvPr/>
-        </p:nvCxnSpPr>
-        <p:spPr>
-          <a:xfrm rot="5400000">
-            <a:off x="6213449" y="1754875"/>
-            <a:ext cx="882074" cy="585750"/>
-          </a:xfrm>
-          <a:prstGeom prst="curvedConnector4">
-            <a:avLst>
-              <a:gd name="adj1" fmla="val 41277"/>
-              <a:gd name="adj2" fmla="val 139027"/>
-            </a:avLst>
-          </a:prstGeom>
-          <a:ln>
-            <a:solidFill>
-              <a:srgbClr val="913478"/>
-            </a:solidFill>
-          </a:ln>
-        </p:spPr>
-        <p:style>
-          <a:lnRef idx="1">
-            <a:schemeClr val="accent1"/>
-          </a:lnRef>
-          <a:fillRef idx="0">
-            <a:schemeClr val="accent1"/>
-          </a:fillRef>
-          <a:effectRef idx="0">
-            <a:schemeClr val="accent1"/>
-          </a:effectRef>
-          <a:fontRef idx="minor">
-            <a:schemeClr val="tx1"/>
-          </a:fontRef>
-        </p:style>
-      </p:cxnSp>
-      <p:cxnSp>
-        <p:nvCxnSpPr>
-          <p:cNvPr id="36" name="Connecteur en arc 35"/>
-          <p:cNvCxnSpPr>
-            <a:stCxn id="21" idx="3"/>
-            <a:endCxn id="20" idx="2"/>
-          </p:cNvCxnSpPr>
-          <p:nvPr/>
-        </p:nvCxnSpPr>
-        <p:spPr>
-          <a:xfrm flipV="1">
-            <a:off x="7081157" y="1917450"/>
-            <a:ext cx="997131" cy="571337"/>
-          </a:xfrm>
-          <a:prstGeom prst="curvedConnector2">
-            <a:avLst/>
-          </a:prstGeom>
-          <a:ln>
-            <a:solidFill>
-              <a:srgbClr val="913478"/>
-            </a:solidFill>
-          </a:ln>
-        </p:spPr>
-        <p:style>
-          <a:lnRef idx="1">
-            <a:schemeClr val="accent1"/>
-          </a:lnRef>
-          <a:fillRef idx="0">
-            <a:schemeClr val="accent1"/>
-          </a:fillRef>
-          <a:effectRef idx="0">
-            <a:schemeClr val="accent1"/>
-          </a:effectRef>
-          <a:fontRef idx="minor">
-            <a:schemeClr val="tx1"/>
-          </a:fontRef>
-        </p:style>
-      </p:cxnSp>
+            </a:ln>
+          </p:spPr>
+          <p:style>
+            <a:lnRef idx="1">
+              <a:schemeClr val="accent1"/>
+            </a:lnRef>
+            <a:fillRef idx="0">
+              <a:schemeClr val="accent1"/>
+            </a:fillRef>
+            <a:effectRef idx="0">
+              <a:schemeClr val="accent1"/>
+            </a:effectRef>
+            <a:fontRef idx="minor">
+              <a:schemeClr val="tx1"/>
+            </a:fontRef>
+          </p:style>
+        </p:cxnSp>
+        <p:cxnSp>
+          <p:nvCxnSpPr>
+            <p:cNvPr id="34" name="Connecteur en arc 33"/>
+            <p:cNvCxnSpPr>
+              <a:stCxn id="22" idx="2"/>
+              <a:endCxn id="21" idx="1"/>
+            </p:cNvCxnSpPr>
+            <p:nvPr/>
+          </p:nvCxnSpPr>
+          <p:spPr>
+            <a:xfrm rot="5400000">
+              <a:off x="6213449" y="1754875"/>
+              <a:ext cx="882074" cy="585750"/>
+            </a:xfrm>
+            <a:prstGeom prst="curvedConnector4">
+              <a:avLst>
+                <a:gd name="adj1" fmla="val 41277"/>
+                <a:gd name="adj2" fmla="val 139027"/>
+              </a:avLst>
+            </a:prstGeom>
+            <a:ln>
+              <a:solidFill>
+                <a:srgbClr val="913478"/>
+              </a:solidFill>
+            </a:ln>
+          </p:spPr>
+          <p:style>
+            <a:lnRef idx="1">
+              <a:schemeClr val="accent1"/>
+            </a:lnRef>
+            <a:fillRef idx="0">
+              <a:schemeClr val="accent1"/>
+            </a:fillRef>
+            <a:effectRef idx="0">
+              <a:schemeClr val="accent1"/>
+            </a:effectRef>
+            <a:fontRef idx="minor">
+              <a:schemeClr val="tx1"/>
+            </a:fontRef>
+          </p:style>
+        </p:cxnSp>
+        <p:cxnSp>
+          <p:nvCxnSpPr>
+            <p:cNvPr id="36" name="Connecteur en arc 35"/>
+            <p:cNvCxnSpPr>
+              <a:stCxn id="21" idx="3"/>
+              <a:endCxn id="20" idx="2"/>
+            </p:cNvCxnSpPr>
+            <p:nvPr/>
+          </p:nvCxnSpPr>
+          <p:spPr>
+            <a:xfrm flipV="1">
+              <a:off x="7081157" y="1917450"/>
+              <a:ext cx="997131" cy="571337"/>
+            </a:xfrm>
+            <a:prstGeom prst="curvedConnector2">
+              <a:avLst/>
+            </a:prstGeom>
+            <a:ln>
+              <a:solidFill>
+                <a:srgbClr val="913478"/>
+              </a:solidFill>
+            </a:ln>
+          </p:spPr>
+          <p:style>
+            <a:lnRef idx="1">
+              <a:schemeClr val="accent1"/>
+            </a:lnRef>
+            <a:fillRef idx="0">
+              <a:schemeClr val="accent1"/>
+            </a:fillRef>
+            <a:effectRef idx="0">
+              <a:schemeClr val="accent1"/>
+            </a:effectRef>
+            <a:fontRef idx="minor">
+              <a:schemeClr val="tx1"/>
+            </a:fontRef>
+          </p:style>
+        </p:cxnSp>
+      </p:grpSp>
       <p:sp>
         <p:nvSpPr>
           <p:cNvPr id="78" name="Ellipse 77"/>
@@ -4686,408 +4668,199 @@
           </a:p>
         </p:txBody>
       </p:sp>
-      <p:grpSp>
-        <p:nvGrpSpPr>
-          <p:cNvPr id="91" name="Grouper 90"/>
-          <p:cNvGrpSpPr/>
+      <p:sp>
+        <p:nvSpPr>
+          <p:cNvPr id="52" name="Rectangle 51"/>
+          <p:cNvSpPr/>
           <p:nvPr/>
-        </p:nvGrpSpPr>
-        <p:grpSpPr>
-          <a:xfrm>
-            <a:off x="1749981" y="1060820"/>
-            <a:ext cx="3840824" cy="3484739"/>
-            <a:chOff x="1854485" y="1740089"/>
-            <a:chExt cx="3840824" cy="3484739"/>
-          </a:xfrm>
-        </p:grpSpPr>
-        <p:sp>
-          <p:nvSpPr>
-            <p:cNvPr id="52" name="Rectangle 51"/>
-            <p:cNvSpPr/>
-            <p:nvPr/>
-          </p:nvSpPr>
-          <p:spPr>
-            <a:xfrm>
-              <a:off x="2601692" y="1740089"/>
-              <a:ext cx="2449286" cy="400110"/>
-            </a:xfrm>
-            <a:prstGeom prst="rect">
-              <a:avLst/>
-            </a:prstGeom>
-          </p:spPr>
-          <p:txBody>
-            <a:bodyPr wrap="square">
-              <a:spAutoFit/>
-            </a:bodyPr>
-            <a:lstStyle/>
-            <a:p>
-              <a:pPr algn="ctr"/>
-              <a:r>
-                <a:rPr lang="fr-FR" sz="2000" dirty="0" smtClean="0">
-                  <a:solidFill>
-                    <a:srgbClr val="B43F94"/>
-                  </a:solidFill>
-                </a:rPr>
-                <a:t>Savoir-faire</a:t>
-              </a:r>
-            </a:p>
-          </p:txBody>
-        </p:sp>
-        <p:sp>
-          <p:nvSpPr>
-            <p:cNvPr id="53" name="Rectangle 52"/>
-            <p:cNvSpPr/>
-            <p:nvPr/>
-          </p:nvSpPr>
-          <p:spPr>
-            <a:xfrm>
-              <a:off x="3112230" y="2187377"/>
-              <a:ext cx="1033484" cy="523220"/>
-            </a:xfrm>
-            <a:prstGeom prst="rect">
-              <a:avLst/>
-            </a:prstGeom>
-          </p:spPr>
-          <p:txBody>
-            <a:bodyPr wrap="square">
-              <a:spAutoFit/>
-            </a:bodyPr>
-            <a:lstStyle/>
-            <a:p>
-              <a:pPr algn="ctr"/>
-              <a:r>
-                <a:rPr lang="fr-FR" sz="1400" dirty="0" smtClean="0">
-                  <a:solidFill>
-                    <a:srgbClr val="B43F94"/>
-                  </a:solidFill>
-                </a:rPr>
-                <a:t>Gestion de projet</a:t>
-              </a:r>
-            </a:p>
-          </p:txBody>
-        </p:sp>
-        <p:sp>
-          <p:nvSpPr>
-            <p:cNvPr id="54" name="Rectangle 53"/>
-            <p:cNvSpPr/>
-            <p:nvPr/>
-          </p:nvSpPr>
-          <p:spPr>
-            <a:xfrm>
-              <a:off x="4386028" y="2972115"/>
-              <a:ext cx="1234439" cy="307777"/>
-            </a:xfrm>
-            <a:prstGeom prst="rect">
-              <a:avLst/>
-            </a:prstGeom>
-          </p:spPr>
-          <p:txBody>
-            <a:bodyPr wrap="square">
-              <a:spAutoFit/>
-            </a:bodyPr>
-            <a:lstStyle/>
-            <a:p>
-              <a:pPr algn="ctr"/>
-              <a:r>
-                <a:rPr lang="fr-FR" sz="1400" dirty="0" smtClean="0">
-                  <a:solidFill>
-                    <a:srgbClr val="B43F94"/>
-                  </a:solidFill>
-                </a:rPr>
-                <a:t>Négociation</a:t>
-              </a:r>
-            </a:p>
-          </p:txBody>
-        </p:sp>
-        <p:sp>
-          <p:nvSpPr>
-            <p:cNvPr id="55" name="Rectangle 54"/>
-            <p:cNvSpPr/>
-            <p:nvPr/>
-          </p:nvSpPr>
-          <p:spPr>
-            <a:xfrm>
-              <a:off x="2748098" y="4701608"/>
-              <a:ext cx="1068977" cy="523220"/>
-            </a:xfrm>
-            <a:prstGeom prst="rect">
-              <a:avLst/>
-            </a:prstGeom>
-          </p:spPr>
-          <p:txBody>
-            <a:bodyPr wrap="square">
-              <a:spAutoFit/>
-            </a:bodyPr>
-            <a:lstStyle/>
-            <a:p>
-              <a:pPr algn="ctr"/>
-              <a:r>
-                <a:rPr lang="fr-FR" sz="1400" dirty="0" smtClean="0">
-                  <a:solidFill>
-                    <a:srgbClr val="B43F94"/>
-                  </a:solidFill>
-                </a:rPr>
-                <a:t>Expériences coté client</a:t>
-              </a:r>
-            </a:p>
-          </p:txBody>
-        </p:sp>
-        <p:sp>
-          <p:nvSpPr>
-            <p:cNvPr id="56" name="Rectangle 55"/>
-            <p:cNvSpPr/>
-            <p:nvPr/>
-          </p:nvSpPr>
-          <p:spPr>
-            <a:xfrm>
-              <a:off x="1854485" y="3374106"/>
-              <a:ext cx="1493521" cy="523220"/>
-            </a:xfrm>
-            <a:prstGeom prst="rect">
-              <a:avLst/>
-            </a:prstGeom>
-          </p:spPr>
-          <p:txBody>
-            <a:bodyPr wrap="square">
-              <a:spAutoFit/>
-            </a:bodyPr>
-            <a:lstStyle/>
-            <a:p>
-              <a:pPr algn="ctr"/>
-              <a:r>
-                <a:rPr lang="fr-FR" sz="1400" dirty="0" smtClean="0">
-                  <a:solidFill>
-                    <a:srgbClr val="B43F94"/>
-                  </a:solidFill>
-                </a:rPr>
-                <a:t>Collaboration à l’international </a:t>
-              </a:r>
-            </a:p>
-          </p:txBody>
-        </p:sp>
-        <p:cxnSp>
-          <p:nvCxnSpPr>
-            <p:cNvPr id="71" name="Connecteur en angle 70"/>
-            <p:cNvCxnSpPr>
-              <a:stCxn id="53" idx="3"/>
-            </p:cNvCxnSpPr>
-            <p:nvPr/>
-          </p:nvCxnSpPr>
-          <p:spPr>
-            <a:xfrm>
-              <a:off x="4145714" y="2448987"/>
-              <a:ext cx="834505" cy="523128"/>
-            </a:xfrm>
-            <a:prstGeom prst="bentConnector2">
-              <a:avLst/>
-            </a:prstGeom>
-            <a:ln>
-              <a:solidFill>
-                <a:srgbClr val="913478"/>
-              </a:solidFill>
-            </a:ln>
-          </p:spPr>
-          <p:style>
-            <a:lnRef idx="1">
-              <a:schemeClr val="accent1"/>
-            </a:lnRef>
-            <a:fillRef idx="0">
-              <a:schemeClr val="accent1"/>
-            </a:fillRef>
-            <a:effectRef idx="0">
-              <a:schemeClr val="accent1"/>
-            </a:effectRef>
-            <a:fontRef idx="minor">
-              <a:schemeClr val="tx1"/>
-            </a:fontRef>
-          </p:style>
-        </p:cxnSp>
-        <p:cxnSp>
-          <p:nvCxnSpPr>
-            <p:cNvPr id="73" name="Connecteur en angle 72"/>
-            <p:cNvCxnSpPr>
-              <a:stCxn id="53" idx="1"/>
-              <a:endCxn id="56" idx="0"/>
-            </p:cNvCxnSpPr>
-            <p:nvPr/>
-          </p:nvCxnSpPr>
-          <p:spPr>
-            <a:xfrm rot="10800000" flipV="1">
-              <a:off x="2601246" y="2448986"/>
-              <a:ext cx="510984" cy="925119"/>
-            </a:xfrm>
-            <a:prstGeom prst="bentConnector2">
-              <a:avLst/>
-            </a:prstGeom>
-            <a:ln>
-              <a:solidFill>
-                <a:srgbClr val="913478"/>
-              </a:solidFill>
-            </a:ln>
-          </p:spPr>
-          <p:style>
-            <a:lnRef idx="1">
-              <a:schemeClr val="accent1"/>
-            </a:lnRef>
-            <a:fillRef idx="0">
-              <a:schemeClr val="accent1"/>
-            </a:fillRef>
-            <a:effectRef idx="0">
-              <a:schemeClr val="accent1"/>
-            </a:effectRef>
-            <a:fontRef idx="minor">
-              <a:schemeClr val="tx1"/>
-            </a:fontRef>
-          </p:style>
-        </p:cxnSp>
-        <p:cxnSp>
-          <p:nvCxnSpPr>
-            <p:cNvPr id="75" name="Connecteur en angle 74"/>
-            <p:cNvCxnSpPr>
-              <a:stCxn id="56" idx="2"/>
-              <a:endCxn id="55" idx="1"/>
-            </p:cNvCxnSpPr>
-            <p:nvPr/>
-          </p:nvCxnSpPr>
-          <p:spPr>
-            <a:xfrm rot="16200000" flipH="1">
-              <a:off x="2141726" y="4356846"/>
-              <a:ext cx="1065892" cy="146852"/>
-            </a:xfrm>
-            <a:prstGeom prst="bentConnector2">
-              <a:avLst/>
-            </a:prstGeom>
-            <a:ln>
-              <a:solidFill>
-                <a:srgbClr val="913478"/>
-              </a:solidFill>
-            </a:ln>
-          </p:spPr>
-          <p:style>
-            <a:lnRef idx="1">
-              <a:schemeClr val="accent1"/>
-            </a:lnRef>
-            <a:fillRef idx="0">
-              <a:schemeClr val="accent1"/>
-            </a:fillRef>
-            <a:effectRef idx="0">
-              <a:schemeClr val="accent1"/>
-            </a:effectRef>
-            <a:fontRef idx="minor">
-              <a:schemeClr val="tx1"/>
-            </a:fontRef>
-          </p:style>
-        </p:cxnSp>
-        <p:cxnSp>
-          <p:nvCxnSpPr>
-            <p:cNvPr id="77" name="Connecteur en angle 76"/>
-            <p:cNvCxnSpPr>
-              <a:stCxn id="55" idx="3"/>
-              <a:endCxn id="82" idx="2"/>
-            </p:cNvCxnSpPr>
-            <p:nvPr/>
-          </p:nvCxnSpPr>
-          <p:spPr>
-            <a:xfrm flipV="1">
-              <a:off x="3817075" y="4438216"/>
-              <a:ext cx="1186173" cy="525002"/>
-            </a:xfrm>
-            <a:prstGeom prst="bentConnector2">
-              <a:avLst/>
-            </a:prstGeom>
-            <a:ln>
-              <a:solidFill>
-                <a:srgbClr val="913478"/>
-              </a:solidFill>
-            </a:ln>
-          </p:spPr>
-          <p:style>
-            <a:lnRef idx="1">
-              <a:schemeClr val="accent1"/>
-            </a:lnRef>
-            <a:fillRef idx="0">
-              <a:schemeClr val="accent1"/>
-            </a:fillRef>
-            <a:effectRef idx="0">
-              <a:schemeClr val="accent1"/>
-            </a:effectRef>
-            <a:fontRef idx="minor">
-              <a:schemeClr val="tx1"/>
-            </a:fontRef>
-          </p:style>
-        </p:cxnSp>
-        <p:sp>
-          <p:nvSpPr>
-            <p:cNvPr id="82" name="Rectangle 81"/>
-            <p:cNvSpPr/>
-            <p:nvPr/>
-          </p:nvSpPr>
-          <p:spPr>
-            <a:xfrm>
-              <a:off x="4311186" y="3914996"/>
-              <a:ext cx="1384123" cy="523220"/>
-            </a:xfrm>
-            <a:prstGeom prst="rect">
-              <a:avLst/>
-            </a:prstGeom>
-          </p:spPr>
-          <p:txBody>
-            <a:bodyPr wrap="square">
-              <a:spAutoFit/>
-            </a:bodyPr>
-            <a:lstStyle/>
-            <a:p>
-              <a:pPr algn="ctr"/>
-              <a:r>
-                <a:rPr lang="fr-FR" sz="1400" dirty="0" smtClean="0">
-                  <a:solidFill>
-                    <a:srgbClr val="B43F94"/>
-                  </a:solidFill>
-                </a:rPr>
-                <a:t>Connaissances juridiques IT</a:t>
-              </a:r>
-            </a:p>
-          </p:txBody>
-        </p:sp>
-        <p:cxnSp>
-          <p:nvCxnSpPr>
-            <p:cNvPr id="87" name="Connecteur droit 86"/>
-            <p:cNvCxnSpPr>
-              <a:stCxn id="82" idx="0"/>
-              <a:endCxn id="54" idx="2"/>
-            </p:cNvCxnSpPr>
-            <p:nvPr/>
-          </p:nvCxnSpPr>
-          <p:spPr>
-            <a:xfrm flipV="1">
-              <a:off x="5003248" y="3279892"/>
-              <a:ext cx="0" cy="635104"/>
-            </a:xfrm>
-            <a:prstGeom prst="line">
-              <a:avLst/>
-            </a:prstGeom>
-            <a:ln>
-              <a:solidFill>
-                <a:srgbClr val="913478"/>
-              </a:solidFill>
-            </a:ln>
-          </p:spPr>
-          <p:style>
-            <a:lnRef idx="1">
-              <a:schemeClr val="accent1"/>
-            </a:lnRef>
-            <a:fillRef idx="0">
-              <a:schemeClr val="accent1"/>
-            </a:fillRef>
-            <a:effectRef idx="0">
-              <a:schemeClr val="accent1"/>
-            </a:effectRef>
-            <a:fontRef idx="minor">
-              <a:schemeClr val="tx1"/>
-            </a:fontRef>
-          </p:style>
-        </p:cxnSp>
-      </p:grpSp>
+        </p:nvSpPr>
+        <p:spPr>
+          <a:xfrm>
+            <a:off x="2321258" y="825323"/>
+            <a:ext cx="2449286" cy="400110"/>
+          </a:xfrm>
+          <a:prstGeom prst="rect">
+            <a:avLst/>
+          </a:prstGeom>
+        </p:spPr>
+        <p:txBody>
+          <a:bodyPr wrap="square">
+            <a:spAutoFit/>
+          </a:bodyPr>
+          <a:lstStyle/>
+          <a:p>
+            <a:pPr algn="ctr"/>
+            <a:r>
+              <a:rPr lang="fr-FR" sz="2000" dirty="0" smtClean="0">
+                <a:solidFill>
+                  <a:srgbClr val="B43F94"/>
+                </a:solidFill>
+              </a:rPr>
+              <a:t>Savoir-faire</a:t>
+            </a:r>
+          </a:p>
+        </p:txBody>
+      </p:sp>
+      <p:sp>
+        <p:nvSpPr>
+          <p:cNvPr id="53" name="Rectangle 52"/>
+          <p:cNvSpPr/>
+          <p:nvPr/>
+        </p:nvSpPr>
+        <p:spPr>
+          <a:xfrm>
+            <a:off x="4627207" y="2085759"/>
+            <a:ext cx="1033484" cy="523220"/>
+          </a:xfrm>
+          <a:prstGeom prst="rect">
+            <a:avLst/>
+          </a:prstGeom>
+        </p:spPr>
+        <p:txBody>
+          <a:bodyPr wrap="square">
+            <a:spAutoFit/>
+          </a:bodyPr>
+          <a:lstStyle/>
+          <a:p>
+            <a:r>
+              <a:rPr lang="fr-FR" sz="1400" dirty="0" smtClean="0">
+                <a:solidFill>
+                  <a:srgbClr val="B43F94"/>
+                </a:solidFill>
+              </a:rPr>
+              <a:t>Gestion de projet</a:t>
+            </a:r>
+          </a:p>
+        </p:txBody>
+      </p:sp>
+      <p:sp>
+        <p:nvSpPr>
+          <p:cNvPr id="54" name="Rectangle 53"/>
+          <p:cNvSpPr/>
+          <p:nvPr/>
+        </p:nvSpPr>
+        <p:spPr>
+          <a:xfrm>
+            <a:off x="1927111" y="2193481"/>
+            <a:ext cx="1234439" cy="307777"/>
+          </a:xfrm>
+          <a:prstGeom prst="rect">
+            <a:avLst/>
+          </a:prstGeom>
+        </p:spPr>
+        <p:txBody>
+          <a:bodyPr wrap="square">
+            <a:spAutoFit/>
+          </a:bodyPr>
+          <a:lstStyle/>
+          <a:p>
+            <a:r>
+              <a:rPr lang="fr-FR" sz="1400" dirty="0" smtClean="0">
+                <a:solidFill>
+                  <a:srgbClr val="B43F94"/>
+                </a:solidFill>
+              </a:rPr>
+              <a:t>Négociation</a:t>
+            </a:r>
+          </a:p>
+        </p:txBody>
+      </p:sp>
+      <p:sp>
+        <p:nvSpPr>
+          <p:cNvPr id="55" name="Rectangle 54"/>
+          <p:cNvSpPr/>
+          <p:nvPr/>
+        </p:nvSpPr>
+        <p:spPr>
+          <a:xfrm>
+            <a:off x="3949592" y="3581620"/>
+            <a:ext cx="1068977" cy="523220"/>
+          </a:xfrm>
+          <a:prstGeom prst="rect">
+            <a:avLst/>
+          </a:prstGeom>
+        </p:spPr>
+        <p:txBody>
+          <a:bodyPr wrap="square">
+            <a:spAutoFit/>
+          </a:bodyPr>
+          <a:lstStyle/>
+          <a:p>
+            <a:r>
+              <a:rPr lang="fr-FR" sz="1400" dirty="0" smtClean="0">
+                <a:solidFill>
+                  <a:srgbClr val="B43F94"/>
+                </a:solidFill>
+              </a:rPr>
+              <a:t>Expériences coté client</a:t>
+            </a:r>
+          </a:p>
+        </p:txBody>
+      </p:sp>
+      <p:sp>
+        <p:nvSpPr>
+          <p:cNvPr id="56" name="Rectangle 55"/>
+          <p:cNvSpPr/>
+          <p:nvPr/>
+        </p:nvSpPr>
+        <p:spPr>
+          <a:xfrm>
+            <a:off x="2218258" y="3575849"/>
+            <a:ext cx="1493521" cy="523220"/>
+          </a:xfrm>
+          <a:prstGeom prst="rect">
+            <a:avLst/>
+          </a:prstGeom>
+        </p:spPr>
+        <p:txBody>
+          <a:bodyPr wrap="square">
+            <a:spAutoFit/>
+          </a:bodyPr>
+          <a:lstStyle/>
+          <a:p>
+            <a:r>
+              <a:rPr lang="fr-FR" sz="1400" dirty="0" smtClean="0">
+                <a:solidFill>
+                  <a:srgbClr val="B43F94"/>
+                </a:solidFill>
+              </a:rPr>
+              <a:t>Collaboration à l’international </a:t>
+            </a:r>
+          </a:p>
+        </p:txBody>
+      </p:sp>
+      <p:sp>
+        <p:nvSpPr>
+          <p:cNvPr id="82" name="Rectangle 81"/>
+          <p:cNvSpPr/>
+          <p:nvPr/>
+        </p:nvSpPr>
+        <p:spPr>
+          <a:xfrm>
+            <a:off x="3099958" y="2107507"/>
+            <a:ext cx="1384123" cy="523220"/>
+          </a:xfrm>
+          <a:prstGeom prst="rect">
+            <a:avLst/>
+          </a:prstGeom>
+        </p:spPr>
+        <p:txBody>
+          <a:bodyPr wrap="square">
+            <a:spAutoFit/>
+          </a:bodyPr>
+          <a:lstStyle/>
+          <a:p>
+            <a:r>
+              <a:rPr lang="fr-FR" sz="1400" dirty="0" smtClean="0">
+                <a:solidFill>
+                  <a:srgbClr val="B43F94"/>
+                </a:solidFill>
+              </a:rPr>
+              <a:t>Connaissances juridiques IT</a:t>
+            </a:r>
+          </a:p>
+        </p:txBody>
+      </p:sp>
       <p:sp>
         <p:nvSpPr>
           <p:cNvPr id="96" name="Rectangle 95"/>
@@ -5263,60 +5036,6 @@
               </a:rPr>
               <a:t>ssurance</a:t>
             </a:r>
-          </a:p>
-        </p:txBody>
-      </p:sp>
-      <p:sp>
-        <p:nvSpPr>
-          <p:cNvPr id="101" name="ZoneTexte 100"/>
-          <p:cNvSpPr txBox="1"/>
-          <p:nvPr/>
-        </p:nvSpPr>
-        <p:spPr>
-          <a:xfrm rot="18937738">
-            <a:off x="2065707" y="-122054"/>
-            <a:ext cx="2880025" cy="1754326"/>
-          </a:xfrm>
-          <a:prstGeom prst="rect">
-            <a:avLst/>
-          </a:prstGeom>
-          <a:noFill/>
-        </p:spPr>
-        <p:txBody>
-          <a:bodyPr wrap="square" rtlCol="0">
-            <a:spAutoFit/>
-          </a:bodyPr>
-          <a:lstStyle/>
-          <a:p>
-            <a:r>
-              <a:rPr lang="fr-FR" sz="3600" dirty="0" smtClean="0">
-                <a:solidFill>
-                  <a:srgbClr val="5B9BD5"/>
-                </a:solidFill>
-              </a:rPr>
-              <a:t>Quand </a:t>
-            </a:r>
-            <a:r>
-              <a:rPr lang="fr-FR" sz="3600" dirty="0" err="1" smtClean="0">
-                <a:solidFill>
-                  <a:srgbClr val="5B9BD5"/>
-                </a:solidFill>
-              </a:rPr>
-              <a:t>hover</a:t>
-            </a:r>
-            <a:r>
-              <a:rPr lang="fr-FR" sz="3600" dirty="0" smtClean="0">
-                <a:solidFill>
-                  <a:srgbClr val="5B9BD5"/>
-                </a:solidFill>
-              </a:rPr>
-              <a:t> animations lignes</a:t>
-            </a:r>
-            <a:endParaRPr lang="fr-FR" sz="3600" dirty="0">
-              <a:solidFill>
-                <a:srgbClr val="5B9BD5"/>
-              </a:solidFill>
-            </a:endParaRPr>
           </a:p>
         </p:txBody>
       </p:sp>

</xml_diff>